<commit_message>
updated style and logo
</commit_message>
<xml_diff>
--- a/Icon.pptx
+++ b/Icon.pptx
@@ -6,6 +6,7 @@
   </p:sldMasterIdLst>
   <p:sldIdLst>
     <p:sldId id="257" r:id="rId2"/>
+    <p:sldId id="258" r:id="rId3"/>
   </p:sldIdLst>
   <p:sldSz cx="12192000" cy="6858000"/>
   <p:notesSz cx="6858000" cy="9144000"/>
@@ -104,6 +105,11 @@
       </a:defRPr>
     </a:lvl9pPr>
   </p:defaultTextStyle>
+  <p:extLst>
+    <p:ext uri="{EFAFB233-063F-42B5-8137-9DF3F51BA10A}">
+      <p15:sldGuideLst xmlns:p15="http://schemas.microsoft.com/office/powerpoint/2012/main"/>
+    </p:ext>
+  </p:extLst>
 </p:presentation>
 </file>
 
@@ -254,7 +260,7 @@
           <a:p>
             <a:fld id="{33ACF1B7-20F7-D24E-B4CC-053983E2E6C8}" type="datetimeFigureOut">
               <a:rPr lang="en-US" smtClean="0"/>
-              <a:t>9/21/18</a:t>
+              <a:t>9/22/18</a:t>
             </a:fld>
             <a:endParaRPr lang="en-US"/>
           </a:p>
@@ -452,7 +458,7 @@
           <a:p>
             <a:fld id="{33ACF1B7-20F7-D24E-B4CC-053983E2E6C8}" type="datetimeFigureOut">
               <a:rPr lang="en-US" smtClean="0"/>
-              <a:t>9/21/18</a:t>
+              <a:t>9/22/18</a:t>
             </a:fld>
             <a:endParaRPr lang="en-US"/>
           </a:p>
@@ -660,7 +666,7 @@
           <a:p>
             <a:fld id="{33ACF1B7-20F7-D24E-B4CC-053983E2E6C8}" type="datetimeFigureOut">
               <a:rPr lang="en-US" smtClean="0"/>
-              <a:t>9/21/18</a:t>
+              <a:t>9/22/18</a:t>
             </a:fld>
             <a:endParaRPr lang="en-US"/>
           </a:p>
@@ -858,7 +864,7 @@
           <a:p>
             <a:fld id="{33ACF1B7-20F7-D24E-B4CC-053983E2E6C8}" type="datetimeFigureOut">
               <a:rPr lang="en-US" smtClean="0"/>
-              <a:t>9/21/18</a:t>
+              <a:t>9/22/18</a:t>
             </a:fld>
             <a:endParaRPr lang="en-US"/>
           </a:p>
@@ -1133,7 +1139,7 @@
           <a:p>
             <a:fld id="{33ACF1B7-20F7-D24E-B4CC-053983E2E6C8}" type="datetimeFigureOut">
               <a:rPr lang="en-US" smtClean="0"/>
-              <a:t>9/21/18</a:t>
+              <a:t>9/22/18</a:t>
             </a:fld>
             <a:endParaRPr lang="en-US"/>
           </a:p>
@@ -1398,7 +1404,7 @@
           <a:p>
             <a:fld id="{33ACF1B7-20F7-D24E-B4CC-053983E2E6C8}" type="datetimeFigureOut">
               <a:rPr lang="en-US" smtClean="0"/>
-              <a:t>9/21/18</a:t>
+              <a:t>9/22/18</a:t>
             </a:fld>
             <a:endParaRPr lang="en-US"/>
           </a:p>
@@ -1810,7 +1816,7 @@
           <a:p>
             <a:fld id="{33ACF1B7-20F7-D24E-B4CC-053983E2E6C8}" type="datetimeFigureOut">
               <a:rPr lang="en-US" smtClean="0"/>
-              <a:t>9/21/18</a:t>
+              <a:t>9/22/18</a:t>
             </a:fld>
             <a:endParaRPr lang="en-US"/>
           </a:p>
@@ -1951,7 +1957,7 @@
           <a:p>
             <a:fld id="{33ACF1B7-20F7-D24E-B4CC-053983E2E6C8}" type="datetimeFigureOut">
               <a:rPr lang="en-US" smtClean="0"/>
-              <a:t>9/21/18</a:t>
+              <a:t>9/22/18</a:t>
             </a:fld>
             <a:endParaRPr lang="en-US"/>
           </a:p>
@@ -2064,7 +2070,7 @@
           <a:p>
             <a:fld id="{33ACF1B7-20F7-D24E-B4CC-053983E2E6C8}" type="datetimeFigureOut">
               <a:rPr lang="en-US" smtClean="0"/>
-              <a:t>9/21/18</a:t>
+              <a:t>9/22/18</a:t>
             </a:fld>
             <a:endParaRPr lang="en-US"/>
           </a:p>
@@ -2375,7 +2381,7 @@
           <a:p>
             <a:fld id="{33ACF1B7-20F7-D24E-B4CC-053983E2E6C8}" type="datetimeFigureOut">
               <a:rPr lang="en-US" smtClean="0"/>
-              <a:t>9/21/18</a:t>
+              <a:t>9/22/18</a:t>
             </a:fld>
             <a:endParaRPr lang="en-US"/>
           </a:p>
@@ -2663,7 +2669,7 @@
           <a:p>
             <a:fld id="{33ACF1B7-20F7-D24E-B4CC-053983E2E6C8}" type="datetimeFigureOut">
               <a:rPr lang="en-US" smtClean="0"/>
-              <a:t>9/21/18</a:t>
+              <a:t>9/22/18</a:t>
             </a:fld>
             <a:endParaRPr lang="en-US"/>
           </a:p>
@@ -2904,7 +2910,7 @@
           <a:p>
             <a:fld id="{33ACF1B7-20F7-D24E-B4CC-053983E2E6C8}" type="datetimeFigureOut">
               <a:rPr lang="en-US" smtClean="0"/>
-              <a:t>9/21/18</a:t>
+              <a:t>9/22/18</a:t>
             </a:fld>
             <a:endParaRPr lang="en-US"/>
           </a:p>
@@ -3420,6 +3426,108 @@
 </p:sld>
 </file>
 
+<file path=ppt/slides/slide2.xml><?xml version="1.0" encoding="utf-8"?>
+<p:sld xmlns:a="http://schemas.openxmlformats.org/drawingml/2006/main" xmlns:r="http://schemas.openxmlformats.org/officeDocument/2006/relationships" xmlns:p="http://schemas.openxmlformats.org/presentationml/2006/main">
+  <p:cSld>
+    <p:spTree>
+      <p:nvGrpSpPr>
+        <p:cNvPr id="1" name=""/>
+        <p:cNvGrpSpPr/>
+        <p:nvPr/>
+      </p:nvGrpSpPr>
+      <p:grpSpPr>
+        <a:xfrm>
+          <a:off x="0" y="0"/>
+          <a:ext cx="0" cy="0"/>
+          <a:chOff x="0" y="0"/>
+          <a:chExt cx="0" cy="0"/>
+        </a:xfrm>
+      </p:grpSpPr>
+      <p:sp>
+        <p:nvSpPr>
+          <p:cNvPr id="4" name="Rounded Rectangle 3">
+            <a:extLst>
+              <a:ext uri="{FF2B5EF4-FFF2-40B4-BE49-F238E27FC236}">
+                <a16:creationId xmlns:a16="http://schemas.microsoft.com/office/drawing/2014/main" id="{1E6A0ECC-88F2-A947-8B76-6588D2246895}"/>
+              </a:ext>
+            </a:extLst>
+          </p:cNvPr>
+          <p:cNvSpPr/>
+          <p:nvPr/>
+        </p:nvSpPr>
+        <p:spPr>
+          <a:xfrm>
+            <a:off x="2254102" y="1499191"/>
+            <a:ext cx="3274828" cy="3274828"/>
+          </a:xfrm>
+          <a:prstGeom prst="roundRect">
+            <a:avLst/>
+          </a:prstGeom>
+          <a:solidFill>
+            <a:srgbClr val="205581"/>
+          </a:solidFill>
+          <a:ln>
+            <a:noFill/>
+          </a:ln>
+          <a:effectLst>
+            <a:outerShdw blurRad="50800" dist="38100" dir="2700000" algn="tl" rotWithShape="0">
+              <a:prstClr val="black">
+                <a:alpha val="40000"/>
+              </a:prstClr>
+            </a:outerShdw>
+          </a:effectLst>
+          <a:scene3d>
+            <a:camera prst="orthographicFront"/>
+            <a:lightRig rig="threePt" dir="t"/>
+          </a:scene3d>
+          <a:sp3d prstMaterial="matte">
+            <a:bevelT/>
+          </a:sp3d>
+        </p:spPr>
+        <p:style>
+          <a:lnRef idx="2">
+            <a:schemeClr val="accent1">
+              <a:shade val="50000"/>
+            </a:schemeClr>
+          </a:lnRef>
+          <a:fillRef idx="1">
+            <a:schemeClr val="accent1"/>
+          </a:fillRef>
+          <a:effectRef idx="0">
+            <a:schemeClr val="accent1"/>
+          </a:effectRef>
+          <a:fontRef idx="minor">
+            <a:schemeClr val="lt1"/>
+          </a:fontRef>
+        </p:style>
+        <p:txBody>
+          <a:bodyPr rtlCol="0" anchor="ctr"/>
+          <a:lstStyle/>
+          <a:p>
+            <a:pPr algn="ctr"/>
+            <a:r>
+              <a:rPr lang="en-US" sz="12800" dirty="0">
+                <a:latin typeface="Alte Haas Grotesk" panose="02000503000000020004" pitchFamily="2" charset="77"/>
+                <a:cs typeface="Phosphate Solid" panose="02000506050000020004" pitchFamily="2" charset="77"/>
+              </a:rPr>
+              <a:t>JB</a:t>
+            </a:r>
+          </a:p>
+        </p:txBody>
+      </p:sp>
+    </p:spTree>
+    <p:extLst>
+      <p:ext uri="{BB962C8B-B14F-4D97-AF65-F5344CB8AC3E}">
+        <p14:creationId xmlns:p14="http://schemas.microsoft.com/office/powerpoint/2010/main" val="2467002827"/>
+      </p:ext>
+    </p:extLst>
+  </p:cSld>
+  <p:clrMapOvr>
+    <a:masterClrMapping/>
+  </p:clrMapOvr>
+</p:sld>
+</file>
+
 <file path=ppt/theme/theme1.xml><?xml version="1.0" encoding="utf-8"?>
 <a:theme xmlns:a="http://schemas.openxmlformats.org/drawingml/2006/main" name="Office Theme">
   <a:themeElements>

</xml_diff>